<commit_message>
RoboRA 0.7 initial release
</commit_message>
<xml_diff>
--- a/RoboRA/what is Robo RA.pptx
+++ b/RoboRA/what is Robo RA.pptx
@@ -112,6 +112,11 @@
       </a:defRPr>
     </a:lvl9pPr>
   </p:defaultTextStyle>
+  <p:extLst>
+    <p:ext uri="{EFAFB233-063F-42B5-8137-9DF3F51BA10A}">
+      <p15:sldGuideLst xmlns:p15="http://schemas.microsoft.com/office/powerpoint/2012/main"/>
+    </p:ext>
+  </p:extLst>
 </p:presentation>
 </file>
 
@@ -125,6 +130,10 @@
     </p:extLst>
   </p:cmAuthor>
 </p:cmAuthorLst>
+</file>
+
+<file path=ppt/revisionInfo.xml><?xml version="1.0" encoding="utf-8"?>
+<p1510:revInfo xmlns:a="http://schemas.openxmlformats.org/drawingml/2006/main" xmlns:r="http://schemas.openxmlformats.org/officeDocument/2006/relationships" xmlns:p1510="http://schemas.microsoft.com/office/powerpoint/2015/10/main"/>
 </file>
 
 <file path=ppt/slideLayouts/slideLayout1.xml><?xml version="1.0" encoding="utf-8"?>
@@ -169,10 +178,9 @@
           </a:lstStyle>
           <a:p>
             <a:r>
-              <a:rPr lang="en-US" smtClean="0"/>
+              <a:rPr lang="en-US"/>
               <a:t>Click to edit Master title style</a:t>
             </a:r>
-            <a:endParaRPr lang="en-US"/>
           </a:p>
         </p:txBody>
       </p:sp>
@@ -234,10 +242,9 @@
           </a:lstStyle>
           <a:p>
             <a:r>
-              <a:rPr lang="en-US" smtClean="0"/>
+              <a:rPr lang="en-US"/>
               <a:t>Click to edit Master subtitle style</a:t>
             </a:r>
-            <a:endParaRPr lang="en-US"/>
           </a:p>
         </p:txBody>
       </p:sp>
@@ -258,7 +265,7 @@
           <a:p>
             <a:fld id="{3A6CD8A0-B02D-4464-B9E1-045C2F1181EE}" type="datetimeFigureOut">
               <a:rPr lang="en-US" smtClean="0"/>
-              <a:t>12/12/2017</a:t>
+              <a:t>12/20/2017</a:t>
             </a:fld>
             <a:endParaRPr lang="en-US"/>
           </a:p>
@@ -352,10 +359,9 @@
           <a:lstStyle/>
           <a:p>
             <a:r>
-              <a:rPr lang="en-US" smtClean="0"/>
+              <a:rPr lang="en-US"/>
               <a:t>Click to edit Master title style</a:t>
             </a:r>
-            <a:endParaRPr lang="en-US"/>
           </a:p>
         </p:txBody>
       </p:sp>
@@ -376,38 +382,37 @@
           <a:p>
             <a:pPr lvl="0"/>
             <a:r>
-              <a:rPr lang="en-US" smtClean="0"/>
+              <a:rPr lang="en-US"/>
               <a:t>Edit Master text styles</a:t>
             </a:r>
           </a:p>
           <a:p>
             <a:pPr lvl="1"/>
             <a:r>
-              <a:rPr lang="en-US" smtClean="0"/>
+              <a:rPr lang="en-US"/>
               <a:t>Second level</a:t>
             </a:r>
           </a:p>
           <a:p>
             <a:pPr lvl="2"/>
             <a:r>
-              <a:rPr lang="en-US" smtClean="0"/>
+              <a:rPr lang="en-US"/>
               <a:t>Third level</a:t>
             </a:r>
           </a:p>
           <a:p>
             <a:pPr lvl="3"/>
             <a:r>
-              <a:rPr lang="en-US" smtClean="0"/>
+              <a:rPr lang="en-US"/>
               <a:t>Fourth level</a:t>
             </a:r>
           </a:p>
           <a:p>
             <a:pPr lvl="4"/>
             <a:r>
-              <a:rPr lang="en-US" smtClean="0"/>
+              <a:rPr lang="en-US"/>
               <a:t>Fifth level</a:t>
             </a:r>
-            <a:endParaRPr lang="en-US"/>
           </a:p>
         </p:txBody>
       </p:sp>
@@ -428,7 +433,7 @@
           <a:p>
             <a:fld id="{3A6CD8A0-B02D-4464-B9E1-045C2F1181EE}" type="datetimeFigureOut">
               <a:rPr lang="en-US" smtClean="0"/>
-              <a:t>12/12/2017</a:t>
+              <a:t>12/20/2017</a:t>
             </a:fld>
             <a:endParaRPr lang="en-US"/>
           </a:p>
@@ -527,10 +532,9 @@
           <a:lstStyle/>
           <a:p>
             <a:r>
-              <a:rPr lang="en-US" smtClean="0"/>
+              <a:rPr lang="en-US"/>
               <a:t>Click to edit Master title style</a:t>
             </a:r>
-            <a:endParaRPr lang="en-US"/>
           </a:p>
         </p:txBody>
       </p:sp>
@@ -556,38 +560,37 @@
           <a:p>
             <a:pPr lvl="0"/>
             <a:r>
-              <a:rPr lang="en-US" smtClean="0"/>
+              <a:rPr lang="en-US"/>
               <a:t>Edit Master text styles</a:t>
             </a:r>
           </a:p>
           <a:p>
             <a:pPr lvl="1"/>
             <a:r>
-              <a:rPr lang="en-US" smtClean="0"/>
+              <a:rPr lang="en-US"/>
               <a:t>Second level</a:t>
             </a:r>
           </a:p>
           <a:p>
             <a:pPr lvl="2"/>
             <a:r>
-              <a:rPr lang="en-US" smtClean="0"/>
+              <a:rPr lang="en-US"/>
               <a:t>Third level</a:t>
             </a:r>
           </a:p>
           <a:p>
             <a:pPr lvl="3"/>
             <a:r>
-              <a:rPr lang="en-US" smtClean="0"/>
+              <a:rPr lang="en-US"/>
               <a:t>Fourth level</a:t>
             </a:r>
           </a:p>
           <a:p>
             <a:pPr lvl="4"/>
             <a:r>
-              <a:rPr lang="en-US" smtClean="0"/>
+              <a:rPr lang="en-US"/>
               <a:t>Fifth level</a:t>
             </a:r>
-            <a:endParaRPr lang="en-US"/>
           </a:p>
         </p:txBody>
       </p:sp>
@@ -608,7 +611,7 @@
           <a:p>
             <a:fld id="{3A6CD8A0-B02D-4464-B9E1-045C2F1181EE}" type="datetimeFigureOut">
               <a:rPr lang="en-US" smtClean="0"/>
-              <a:t>12/12/2017</a:t>
+              <a:t>12/20/2017</a:t>
             </a:fld>
             <a:endParaRPr lang="en-US"/>
           </a:p>
@@ -702,10 +705,9 @@
           <a:lstStyle/>
           <a:p>
             <a:r>
-              <a:rPr lang="en-US" smtClean="0"/>
+              <a:rPr lang="en-US"/>
               <a:t>Click to edit Master title style</a:t>
             </a:r>
-            <a:endParaRPr lang="en-US"/>
           </a:p>
         </p:txBody>
       </p:sp>
@@ -726,38 +728,37 @@
           <a:p>
             <a:pPr lvl="0"/>
             <a:r>
-              <a:rPr lang="en-US" smtClean="0"/>
+              <a:rPr lang="en-US"/>
               <a:t>Edit Master text styles</a:t>
             </a:r>
           </a:p>
           <a:p>
             <a:pPr lvl="1"/>
             <a:r>
-              <a:rPr lang="en-US" smtClean="0"/>
+              <a:rPr lang="en-US"/>
               <a:t>Second level</a:t>
             </a:r>
           </a:p>
           <a:p>
             <a:pPr lvl="2"/>
             <a:r>
-              <a:rPr lang="en-US" smtClean="0"/>
+              <a:rPr lang="en-US"/>
               <a:t>Third level</a:t>
             </a:r>
           </a:p>
           <a:p>
             <a:pPr lvl="3"/>
             <a:r>
-              <a:rPr lang="en-US" smtClean="0"/>
+              <a:rPr lang="en-US"/>
               <a:t>Fourth level</a:t>
             </a:r>
           </a:p>
           <a:p>
             <a:pPr lvl="4"/>
             <a:r>
-              <a:rPr lang="en-US" smtClean="0"/>
+              <a:rPr lang="en-US"/>
               <a:t>Fifth level</a:t>
             </a:r>
-            <a:endParaRPr lang="en-US"/>
           </a:p>
         </p:txBody>
       </p:sp>
@@ -778,7 +779,7 @@
           <a:p>
             <a:fld id="{3A6CD8A0-B02D-4464-B9E1-045C2F1181EE}" type="datetimeFigureOut">
               <a:rPr lang="en-US" smtClean="0"/>
-              <a:t>12/12/2017</a:t>
+              <a:t>12/20/2017</a:t>
             </a:fld>
             <a:endParaRPr lang="en-US"/>
           </a:p>
@@ -881,10 +882,9 @@
           </a:lstStyle>
           <a:p>
             <a:r>
-              <a:rPr lang="en-US" smtClean="0"/>
+              <a:rPr lang="en-US"/>
               <a:t>Click to edit Master title style</a:t>
             </a:r>
-            <a:endParaRPr lang="en-US"/>
           </a:p>
         </p:txBody>
       </p:sp>
@@ -1001,7 +1001,7 @@
           <a:p>
             <a:pPr lvl="0"/>
             <a:r>
-              <a:rPr lang="en-US" smtClean="0"/>
+              <a:rPr lang="en-US"/>
               <a:t>Edit Master text styles</a:t>
             </a:r>
           </a:p>
@@ -1024,7 +1024,7 @@
           <a:p>
             <a:fld id="{3A6CD8A0-B02D-4464-B9E1-045C2F1181EE}" type="datetimeFigureOut">
               <a:rPr lang="en-US" smtClean="0"/>
-              <a:t>12/12/2017</a:t>
+              <a:t>12/20/2017</a:t>
             </a:fld>
             <a:endParaRPr lang="en-US"/>
           </a:p>
@@ -1118,10 +1118,9 @@
           <a:lstStyle/>
           <a:p>
             <a:r>
-              <a:rPr lang="en-US" smtClean="0"/>
+              <a:rPr lang="en-US"/>
               <a:t>Click to edit Master title style</a:t>
             </a:r>
-            <a:endParaRPr lang="en-US"/>
           </a:p>
         </p:txBody>
       </p:sp>
@@ -1147,38 +1146,37 @@
           <a:p>
             <a:pPr lvl="0"/>
             <a:r>
-              <a:rPr lang="en-US" smtClean="0"/>
+              <a:rPr lang="en-US"/>
               <a:t>Edit Master text styles</a:t>
             </a:r>
           </a:p>
           <a:p>
             <a:pPr lvl="1"/>
             <a:r>
-              <a:rPr lang="en-US" smtClean="0"/>
+              <a:rPr lang="en-US"/>
               <a:t>Second level</a:t>
             </a:r>
           </a:p>
           <a:p>
             <a:pPr lvl="2"/>
             <a:r>
-              <a:rPr lang="en-US" smtClean="0"/>
+              <a:rPr lang="en-US"/>
               <a:t>Third level</a:t>
             </a:r>
           </a:p>
           <a:p>
             <a:pPr lvl="3"/>
             <a:r>
-              <a:rPr lang="en-US" smtClean="0"/>
+              <a:rPr lang="en-US"/>
               <a:t>Fourth level</a:t>
             </a:r>
           </a:p>
           <a:p>
             <a:pPr lvl="4"/>
             <a:r>
-              <a:rPr lang="en-US" smtClean="0"/>
+              <a:rPr lang="en-US"/>
               <a:t>Fifth level</a:t>
             </a:r>
-            <a:endParaRPr lang="en-US"/>
           </a:p>
         </p:txBody>
       </p:sp>
@@ -1204,38 +1202,37 @@
           <a:p>
             <a:pPr lvl="0"/>
             <a:r>
-              <a:rPr lang="en-US" smtClean="0"/>
+              <a:rPr lang="en-US"/>
               <a:t>Edit Master text styles</a:t>
             </a:r>
           </a:p>
           <a:p>
             <a:pPr lvl="1"/>
             <a:r>
-              <a:rPr lang="en-US" smtClean="0"/>
+              <a:rPr lang="en-US"/>
               <a:t>Second level</a:t>
             </a:r>
           </a:p>
           <a:p>
             <a:pPr lvl="2"/>
             <a:r>
-              <a:rPr lang="en-US" smtClean="0"/>
+              <a:rPr lang="en-US"/>
               <a:t>Third level</a:t>
             </a:r>
           </a:p>
           <a:p>
             <a:pPr lvl="3"/>
             <a:r>
-              <a:rPr lang="en-US" smtClean="0"/>
+              <a:rPr lang="en-US"/>
               <a:t>Fourth level</a:t>
             </a:r>
           </a:p>
           <a:p>
             <a:pPr lvl="4"/>
             <a:r>
-              <a:rPr lang="en-US" smtClean="0"/>
+              <a:rPr lang="en-US"/>
               <a:t>Fifth level</a:t>
             </a:r>
-            <a:endParaRPr lang="en-US"/>
           </a:p>
         </p:txBody>
       </p:sp>
@@ -1256,7 +1253,7 @@
           <a:p>
             <a:fld id="{3A6CD8A0-B02D-4464-B9E1-045C2F1181EE}" type="datetimeFigureOut">
               <a:rPr lang="en-US" smtClean="0"/>
-              <a:t>12/12/2017</a:t>
+              <a:t>12/20/2017</a:t>
             </a:fld>
             <a:endParaRPr lang="en-US"/>
           </a:p>
@@ -1355,10 +1352,9 @@
           <a:lstStyle/>
           <a:p>
             <a:r>
-              <a:rPr lang="en-US" smtClean="0"/>
+              <a:rPr lang="en-US"/>
               <a:t>Click to edit Master title style</a:t>
             </a:r>
-            <a:endParaRPr lang="en-US"/>
           </a:p>
         </p:txBody>
       </p:sp>
@@ -1421,7 +1417,7 @@
           <a:p>
             <a:pPr lvl="0"/>
             <a:r>
-              <a:rPr lang="en-US" smtClean="0"/>
+              <a:rPr lang="en-US"/>
               <a:t>Edit Master text styles</a:t>
             </a:r>
           </a:p>
@@ -1449,38 +1445,37 @@
           <a:p>
             <a:pPr lvl="0"/>
             <a:r>
-              <a:rPr lang="en-US" smtClean="0"/>
+              <a:rPr lang="en-US"/>
               <a:t>Edit Master text styles</a:t>
             </a:r>
           </a:p>
           <a:p>
             <a:pPr lvl="1"/>
             <a:r>
-              <a:rPr lang="en-US" smtClean="0"/>
+              <a:rPr lang="en-US"/>
               <a:t>Second level</a:t>
             </a:r>
           </a:p>
           <a:p>
             <a:pPr lvl="2"/>
             <a:r>
-              <a:rPr lang="en-US" smtClean="0"/>
+              <a:rPr lang="en-US"/>
               <a:t>Third level</a:t>
             </a:r>
           </a:p>
           <a:p>
             <a:pPr lvl="3"/>
             <a:r>
-              <a:rPr lang="en-US" smtClean="0"/>
+              <a:rPr lang="en-US"/>
               <a:t>Fourth level</a:t>
             </a:r>
           </a:p>
           <a:p>
             <a:pPr lvl="4"/>
             <a:r>
-              <a:rPr lang="en-US" smtClean="0"/>
+              <a:rPr lang="en-US"/>
               <a:t>Fifth level</a:t>
             </a:r>
-            <a:endParaRPr lang="en-US"/>
           </a:p>
         </p:txBody>
       </p:sp>
@@ -1543,7 +1538,7 @@
           <a:p>
             <a:pPr lvl="0"/>
             <a:r>
-              <a:rPr lang="en-US" smtClean="0"/>
+              <a:rPr lang="en-US"/>
               <a:t>Edit Master text styles</a:t>
             </a:r>
           </a:p>
@@ -1571,38 +1566,37 @@
           <a:p>
             <a:pPr lvl="0"/>
             <a:r>
-              <a:rPr lang="en-US" smtClean="0"/>
+              <a:rPr lang="en-US"/>
               <a:t>Edit Master text styles</a:t>
             </a:r>
           </a:p>
           <a:p>
             <a:pPr lvl="1"/>
             <a:r>
-              <a:rPr lang="en-US" smtClean="0"/>
+              <a:rPr lang="en-US"/>
               <a:t>Second level</a:t>
             </a:r>
           </a:p>
           <a:p>
             <a:pPr lvl="2"/>
             <a:r>
-              <a:rPr lang="en-US" smtClean="0"/>
+              <a:rPr lang="en-US"/>
               <a:t>Third level</a:t>
             </a:r>
           </a:p>
           <a:p>
             <a:pPr lvl="3"/>
             <a:r>
-              <a:rPr lang="en-US" smtClean="0"/>
+              <a:rPr lang="en-US"/>
               <a:t>Fourth level</a:t>
             </a:r>
           </a:p>
           <a:p>
             <a:pPr lvl="4"/>
             <a:r>
-              <a:rPr lang="en-US" smtClean="0"/>
+              <a:rPr lang="en-US"/>
               <a:t>Fifth level</a:t>
             </a:r>
-            <a:endParaRPr lang="en-US"/>
           </a:p>
         </p:txBody>
       </p:sp>
@@ -1623,7 +1617,7 @@
           <a:p>
             <a:fld id="{3A6CD8A0-B02D-4464-B9E1-045C2F1181EE}" type="datetimeFigureOut">
               <a:rPr lang="en-US" smtClean="0"/>
-              <a:t>12/12/2017</a:t>
+              <a:t>12/20/2017</a:t>
             </a:fld>
             <a:endParaRPr lang="en-US"/>
           </a:p>
@@ -1717,10 +1711,9 @@
           <a:lstStyle/>
           <a:p>
             <a:r>
-              <a:rPr lang="en-US" smtClean="0"/>
+              <a:rPr lang="en-US"/>
               <a:t>Click to edit Master title style</a:t>
             </a:r>
-            <a:endParaRPr lang="en-US"/>
           </a:p>
         </p:txBody>
       </p:sp>
@@ -1741,7 +1734,7 @@
           <a:p>
             <a:fld id="{3A6CD8A0-B02D-4464-B9E1-045C2F1181EE}" type="datetimeFigureOut">
               <a:rPr lang="en-US" smtClean="0"/>
-              <a:t>12/12/2017</a:t>
+              <a:t>12/20/2017</a:t>
             </a:fld>
             <a:endParaRPr lang="en-US"/>
           </a:p>
@@ -1836,7 +1829,7 @@
           <a:p>
             <a:fld id="{3A6CD8A0-B02D-4464-B9E1-045C2F1181EE}" type="datetimeFigureOut">
               <a:rPr lang="en-US" smtClean="0"/>
-              <a:t>12/12/2017</a:t>
+              <a:t>12/20/2017</a:t>
             </a:fld>
             <a:endParaRPr lang="en-US"/>
           </a:p>
@@ -1939,10 +1932,9 @@
           </a:lstStyle>
           <a:p>
             <a:r>
-              <a:rPr lang="en-US" smtClean="0"/>
+              <a:rPr lang="en-US"/>
               <a:t>Click to edit Master title style</a:t>
             </a:r>
-            <a:endParaRPr lang="en-US"/>
           </a:p>
         </p:txBody>
       </p:sp>
@@ -1996,38 +1988,37 @@
           <a:p>
             <a:pPr lvl="0"/>
             <a:r>
-              <a:rPr lang="en-US" smtClean="0"/>
+              <a:rPr lang="en-US"/>
               <a:t>Edit Master text styles</a:t>
             </a:r>
           </a:p>
           <a:p>
             <a:pPr lvl="1"/>
             <a:r>
-              <a:rPr lang="en-US" smtClean="0"/>
+              <a:rPr lang="en-US"/>
               <a:t>Second level</a:t>
             </a:r>
           </a:p>
           <a:p>
             <a:pPr lvl="2"/>
             <a:r>
-              <a:rPr lang="en-US" smtClean="0"/>
+              <a:rPr lang="en-US"/>
               <a:t>Third level</a:t>
             </a:r>
           </a:p>
           <a:p>
             <a:pPr lvl="3"/>
             <a:r>
-              <a:rPr lang="en-US" smtClean="0"/>
+              <a:rPr lang="en-US"/>
               <a:t>Fourth level</a:t>
             </a:r>
           </a:p>
           <a:p>
             <a:pPr lvl="4"/>
             <a:r>
-              <a:rPr lang="en-US" smtClean="0"/>
+              <a:rPr lang="en-US"/>
               <a:t>Fifth level</a:t>
             </a:r>
-            <a:endParaRPr lang="en-US"/>
           </a:p>
         </p:txBody>
       </p:sp>
@@ -2090,7 +2081,7 @@
           <a:p>
             <a:pPr lvl="0"/>
             <a:r>
-              <a:rPr lang="en-US" smtClean="0"/>
+              <a:rPr lang="en-US"/>
               <a:t>Edit Master text styles</a:t>
             </a:r>
           </a:p>
@@ -2113,7 +2104,7 @@
           <a:p>
             <a:fld id="{3A6CD8A0-B02D-4464-B9E1-045C2F1181EE}" type="datetimeFigureOut">
               <a:rPr lang="en-US" smtClean="0"/>
-              <a:t>12/12/2017</a:t>
+              <a:t>12/20/2017</a:t>
             </a:fld>
             <a:endParaRPr lang="en-US"/>
           </a:p>
@@ -2216,10 +2207,9 @@
           </a:lstStyle>
           <a:p>
             <a:r>
-              <a:rPr lang="en-US" smtClean="0"/>
+              <a:rPr lang="en-US"/>
               <a:t>Click to edit Master title style</a:t>
             </a:r>
-            <a:endParaRPr lang="en-US"/>
           </a:p>
         </p:txBody>
       </p:sp>
@@ -2343,7 +2333,7 @@
           <a:p>
             <a:pPr lvl="0"/>
             <a:r>
-              <a:rPr lang="en-US" smtClean="0"/>
+              <a:rPr lang="en-US"/>
               <a:t>Edit Master text styles</a:t>
             </a:r>
           </a:p>
@@ -2366,7 +2356,7 @@
           <a:p>
             <a:fld id="{3A6CD8A0-B02D-4464-B9E1-045C2F1181EE}" type="datetimeFigureOut">
               <a:rPr lang="en-US" smtClean="0"/>
-              <a:t>12/12/2017</a:t>
+              <a:t>12/20/2017</a:t>
             </a:fld>
             <a:endParaRPr lang="en-US"/>
           </a:p>
@@ -2475,10 +2465,9 @@
           <a:lstStyle/>
           <a:p>
             <a:r>
-              <a:rPr lang="en-US" smtClean="0"/>
+              <a:rPr lang="en-US"/>
               <a:t>Click to edit Master title style</a:t>
             </a:r>
-            <a:endParaRPr lang="en-US"/>
           </a:p>
         </p:txBody>
       </p:sp>
@@ -2509,38 +2498,37 @@
           <a:p>
             <a:pPr lvl="0"/>
             <a:r>
-              <a:rPr lang="en-US" smtClean="0"/>
+              <a:rPr lang="en-US"/>
               <a:t>Edit Master text styles</a:t>
             </a:r>
           </a:p>
           <a:p>
             <a:pPr lvl="1"/>
             <a:r>
-              <a:rPr lang="en-US" smtClean="0"/>
+              <a:rPr lang="en-US"/>
               <a:t>Second level</a:t>
             </a:r>
           </a:p>
           <a:p>
             <a:pPr lvl="2"/>
             <a:r>
-              <a:rPr lang="en-US" smtClean="0"/>
+              <a:rPr lang="en-US"/>
               <a:t>Third level</a:t>
             </a:r>
           </a:p>
           <a:p>
             <a:pPr lvl="3"/>
             <a:r>
-              <a:rPr lang="en-US" smtClean="0"/>
+              <a:rPr lang="en-US"/>
               <a:t>Fourth level</a:t>
             </a:r>
           </a:p>
           <a:p>
             <a:pPr lvl="4"/>
             <a:r>
-              <a:rPr lang="en-US" smtClean="0"/>
+              <a:rPr lang="en-US"/>
               <a:t>Fifth level</a:t>
             </a:r>
-            <a:endParaRPr lang="en-US"/>
           </a:p>
         </p:txBody>
       </p:sp>
@@ -2579,7 +2567,7 @@
           <a:p>
             <a:fld id="{3A6CD8A0-B02D-4464-B9E1-045C2F1181EE}" type="datetimeFigureOut">
               <a:rPr lang="en-US" smtClean="0"/>
-              <a:t>12/12/2017</a:t>
+              <a:t>12/20/2017</a:t>
             </a:fld>
             <a:endParaRPr lang="en-US"/>
           </a:p>
@@ -3006,22 +2994,22 @@
           <a:p>
             <a:pPr algn="l"/>
             <a:r>
-              <a:rPr lang="en-US" sz="8800" b="1" dirty="0" err="1" smtClean="0"/>
+              <a:rPr lang="en-US" sz="8800" b="1" dirty="0" err="1"/>
               <a:t>Robo</a:t>
             </a:r>
             <a:r>
-              <a:rPr lang="en-US" sz="8800" b="1" dirty="0" smtClean="0"/>
+              <a:rPr lang="en-US" sz="8800" b="1" dirty="0"/>
               <a:t> RA</a:t>
             </a:r>
             <a:br>
-              <a:rPr lang="en-US" sz="8800" b="1" dirty="0" smtClean="0"/>
+              <a:rPr lang="en-US" sz="8800" b="1" dirty="0"/>
             </a:br>
             <a:r>
-              <a:rPr lang="en-US" sz="2800" b="1" dirty="0" smtClean="0"/>
+              <a:rPr lang="en-US" sz="2800" b="1" dirty="0"/>
               <a:t>in the PD-3PO family of tools</a:t>
             </a:r>
             <a:br>
-              <a:rPr lang="en-US" sz="2800" b="1" dirty="0" smtClean="0"/>
+              <a:rPr lang="en-US" sz="2800" b="1" dirty="0"/>
             </a:br>
             <a:endParaRPr lang="en-US" sz="4800" dirty="0"/>
           </a:p>
@@ -3051,48 +3039,48 @@
           <a:p>
             <a:pPr algn="l"/>
             <a:r>
-              <a:rPr lang="en-US" sz="3200" b="1" dirty="0" smtClean="0"/>
+              <a:rPr lang="en-US" sz="3200" b="1" dirty="0"/>
               <a:t>Jack Snoeyink</a:t>
             </a:r>
           </a:p>
           <a:p>
             <a:pPr algn="l"/>
             <a:r>
-              <a:rPr lang="en-US" dirty="0" smtClean="0"/>
+              <a:rPr lang="en-US" dirty="0"/>
               <a:t>CISE CCF Algorithmic Foundations</a:t>
             </a:r>
             <a:br>
-              <a:rPr lang="en-US" dirty="0" smtClean="0"/>
+              <a:rPr lang="en-US" dirty="0"/>
             </a:br>
             <a:r>
-              <a:rPr lang="en-US" dirty="0" smtClean="0"/>
+              <a:rPr lang="en-US" dirty="0"/>
               <a:t>UNC Chapel Hill Computer Science</a:t>
             </a:r>
           </a:p>
           <a:p>
             <a:pPr algn="l"/>
             <a:r>
-              <a:rPr lang="en-US" dirty="0" smtClean="0"/>
+              <a:rPr lang="en-US" dirty="0"/>
               <a:t>‘17: </a:t>
             </a:r>
             <a:r>
-              <a:rPr lang="en-US" dirty="0" smtClean="0">
+              <a:rPr lang="en-US" dirty="0">
                 <a:hlinkClick r:id="rId2"/>
               </a:rPr>
               <a:t>jsnoeyin@nsf.gov</a:t>
             </a:r>
             <a:r>
-              <a:rPr lang="en-US" dirty="0" smtClean="0"/>
+              <a:rPr lang="en-US" dirty="0"/>
               <a:t> ; ‘18: </a:t>
             </a:r>
             <a:r>
-              <a:rPr lang="en-US" dirty="0" smtClean="0">
+              <a:rPr lang="en-US" dirty="0">
                 <a:hlinkClick r:id="rId3"/>
               </a:rPr>
               <a:t>snoeyink@cs.unc.edu</a:t>
             </a:r>
             <a:r>
-              <a:rPr lang="en-US" dirty="0" smtClean="0"/>
+              <a:rPr lang="en-US" dirty="0"/>
               <a:t> </a:t>
             </a:r>
           </a:p>
@@ -3103,17 +3091,16 @@
           <a:p>
             <a:pPr algn="l"/>
             <a:r>
-              <a:rPr lang="en-US" dirty="0" smtClean="0"/>
+              <a:rPr lang="en-US" dirty="0"/>
               <a:t>With thanks to:  James Donlon, Wendy Nilsen (CISE), Grace Yuan (ENG)</a:t>
             </a:r>
             <a:br>
-              <a:rPr lang="en-US" dirty="0" smtClean="0"/>
+              <a:rPr lang="en-US" dirty="0"/>
             </a:br>
             <a:r>
-              <a:rPr lang="en-US" dirty="0" smtClean="0"/>
+              <a:rPr lang="en-US" dirty="0"/>
               <a:t>and CISE: Maria Loera, Jonathan Sprinkle, Karen Geary, and many others.</a:t>
             </a:r>
-            <a:endParaRPr lang="en-US" dirty="0"/>
           </a:p>
         </p:txBody>
       </p:sp>
@@ -3157,13 +3144,6 @@
   <p:clrMapOvr>
     <a:masterClrMapping/>
   </p:clrMapOvr>
-  <p:timing>
-    <p:tnLst>
-      <p:par>
-        <p:cTn id="1" dur="indefinite" restart="never" nodeType="tmRoot"/>
-      </p:par>
-    </p:tnLst>
-  </p:timing>
 </p:sld>
 </file>
 
@@ -3203,34 +3183,30 @@
           <a:p>
             <a:pPr algn="ctr"/>
             <a:r>
-              <a:rPr lang="en-US" dirty="0" smtClean="0"/>
+              <a:rPr lang="en-US" dirty="0"/>
               <a:t>What is   </a:t>
             </a:r>
             <a:r>
-              <a:rPr lang="en-US" sz="2400" dirty="0" smtClean="0"/>
+              <a:rPr lang="en-US" sz="2400" dirty="0"/>
               <a:t> </a:t>
             </a:r>
             <a:r>
-              <a:rPr lang="en-US" dirty="0" smtClean="0"/>
+              <a:rPr lang="en-US" dirty="0"/>
               <a:t>                                </a:t>
             </a:r>
             <a:r>
-              <a:rPr lang="en-US" dirty="0" smtClean="0">
+              <a:rPr lang="en-US" dirty="0">
                 <a:solidFill>
                   <a:schemeClr val="bg1"/>
                 </a:solidFill>
               </a:rPr>
               <a:t>.</a:t>
             </a:r>
-            <a:r>
-              <a:rPr lang="en-US" dirty="0" smtClean="0"/>
-              <a:t/>
-            </a:r>
             <a:br>
-              <a:rPr lang="en-US" dirty="0" smtClean="0"/>
+              <a:rPr lang="en-US" dirty="0"/>
             </a:br>
             <a:r>
-              <a:rPr lang="en-US" dirty="0" smtClean="0">
+              <a:rPr lang="en-US" dirty="0">
                 <a:solidFill>
                   <a:schemeClr val="bg1"/>
                 </a:solidFill>
@@ -3238,14 +3214,9 @@
               <a:t>.</a:t>
             </a:r>
             <a:r>
-              <a:rPr lang="en-US" dirty="0" smtClean="0"/>
-              <a:t>           </a:t>
-            </a:r>
-            <a:r>
-              <a:rPr lang="en-US" dirty="0" smtClean="0"/>
-              <a:t>a Review Analysis?</a:t>
-            </a:r>
-            <a:endParaRPr lang="en-US" dirty="0"/>
+              <a:rPr lang="en-US" dirty="0"/>
+              <a:t>           a Review Analysis?</a:t>
+            </a:r>
           </a:p>
         </p:txBody>
       </p:sp>
@@ -3265,33 +3236,33 @@
           <a:lstStyle/>
           <a:p>
             <a:r>
-              <a:rPr lang="en-US" dirty="0" smtClean="0"/>
+              <a:rPr lang="en-US" dirty="0"/>
               <a:t>Who is it for?</a:t>
             </a:r>
           </a:p>
           <a:p>
             <a:r>
-              <a:rPr lang="en-US" dirty="0" smtClean="0"/>
+              <a:rPr lang="en-US" dirty="0"/>
               <a:t>What goes into it?</a:t>
             </a:r>
           </a:p>
           <a:p>
             <a:r>
-              <a:rPr lang="en-US" dirty="0" smtClean="0"/>
+              <a:rPr lang="en-US" dirty="0"/>
               <a:t>How do I create it?</a:t>
             </a:r>
           </a:p>
           <a:p>
             <a:r>
-              <a:rPr lang="en-US" dirty="0" smtClean="0"/>
+              <a:rPr lang="en-US" dirty="0"/>
               <a:t>Why so much tedious, error-prone </a:t>
             </a:r>
             <a:r>
-              <a:rPr lang="en-US" dirty="0" err="1" smtClean="0"/>
+              <a:rPr lang="en-US" dirty="0" err="1"/>
               <a:t>copy&amp;paste</a:t>
             </a:r>
             <a:r>
-              <a:rPr lang="en-US" dirty="0" smtClean="0"/>
+              <a:rPr lang="en-US" dirty="0"/>
               <a:t> to make one?</a:t>
             </a:r>
           </a:p>
@@ -3336,14 +3307,6 @@
   <p:clrMapOvr>
     <a:masterClrMapping/>
   </p:clrMapOvr>
-  <mc:AlternateContent xmlns:mc="http://schemas.openxmlformats.org/markup-compatibility/2006">
-    <mc:Choice xmlns:p14="http://schemas.microsoft.com/office/powerpoint/2010/main" Requires="p14">
-      <p:transition spd="slow" p14:dur="2000"/>
-    </mc:Choice>
-    <mc:Fallback>
-      <p:transition spd="slow"/>
-    </mc:Fallback>
-  </mc:AlternateContent>
   <p:timing>
     <p:tnLst>
       <p:par>
@@ -3465,30 +3428,26 @@
           <a:p>
             <a:pPr algn="ctr"/>
             <a:r>
-              <a:rPr lang="en-US" dirty="0" smtClean="0"/>
+              <a:rPr lang="en-US" dirty="0"/>
               <a:t>What is </a:t>
             </a:r>
             <a:r>
-              <a:rPr lang="en-US" i="1" dirty="0" smtClean="0"/>
+              <a:rPr lang="en-US" i="1" dirty="0"/>
               <a:t>the audience for      </a:t>
             </a:r>
             <a:r>
-              <a:rPr lang="en-US" i="1" dirty="0" smtClean="0">
+              <a:rPr lang="en-US" i="1" dirty="0">
                 <a:solidFill>
                   <a:schemeClr val="bg1"/>
                 </a:solidFill>
               </a:rPr>
               <a:t>.</a:t>
             </a:r>
-            <a:r>
-              <a:rPr lang="en-US" i="1" dirty="0" smtClean="0"/>
-              <a:t/>
-            </a:r>
             <a:br>
-              <a:rPr lang="en-US" i="1" dirty="0" smtClean="0"/>
+              <a:rPr lang="en-US" i="1" dirty="0"/>
             </a:br>
             <a:r>
-              <a:rPr lang="en-US" dirty="0" smtClean="0">
+              <a:rPr lang="en-US" dirty="0">
                 <a:solidFill>
                   <a:schemeClr val="bg1"/>
                 </a:solidFill>
@@ -3496,14 +3455,9 @@
               <a:t>.</a:t>
             </a:r>
             <a:r>
-              <a:rPr lang="en-US" dirty="0" smtClean="0"/>
-              <a:t>           </a:t>
-            </a:r>
-            <a:r>
-              <a:rPr lang="en-US" dirty="0" smtClean="0"/>
-              <a:t>a Review Analysis?</a:t>
-            </a:r>
-            <a:endParaRPr lang="en-US" dirty="0"/>
+              <a:rPr lang="en-US" dirty="0"/>
+              <a:t>           a Review Analysis?</a:t>
+            </a:r>
           </a:p>
         </p:txBody>
       </p:sp>
@@ -3525,37 +3479,37 @@
           <a:lstStyle/>
           <a:p>
             <a:r>
-              <a:rPr lang="en-US" dirty="0" smtClean="0"/>
+              <a:rPr lang="en-US" dirty="0"/>
               <a:t>DD concur by Division Director or Deputy Division Director</a:t>
             </a:r>
           </a:p>
           <a:p>
             <a:r>
-              <a:rPr lang="en-US" dirty="0" smtClean="0"/>
+              <a:rPr lang="en-US" dirty="0"/>
               <a:t>Staff preparing jackets</a:t>
             </a:r>
           </a:p>
           <a:p>
             <a:r>
-              <a:rPr lang="en-US" dirty="0" smtClean="0"/>
+              <a:rPr lang="en-US" dirty="0"/>
               <a:t>Committee of Visitors</a:t>
             </a:r>
           </a:p>
           <a:p>
             <a:r>
-              <a:rPr lang="en-US" dirty="0" smtClean="0"/>
+              <a:rPr lang="en-US" dirty="0"/>
               <a:t>Future Program Directors, including yourself</a:t>
             </a:r>
           </a:p>
           <a:p>
             <a:r>
-              <a:rPr lang="en-US" dirty="0" smtClean="0"/>
+              <a:rPr lang="en-US" dirty="0"/>
               <a:t>Congressional staffers</a:t>
             </a:r>
           </a:p>
           <a:p>
             <a:r>
-              <a:rPr lang="en-US" dirty="0" smtClean="0"/>
+              <a:rPr lang="en-US" dirty="0"/>
               <a:t>Individuals by FOIA request</a:t>
             </a:r>
           </a:p>
@@ -3749,15 +3703,15 @@
           <a:p>
             <a:pPr algn="ctr"/>
             <a:r>
-              <a:rPr lang="en-US" dirty="0" smtClean="0"/>
+              <a:rPr lang="en-US" dirty="0"/>
               <a:t>What is </a:t>
             </a:r>
             <a:r>
-              <a:rPr lang="en-US" i="1" dirty="0" smtClean="0"/>
+              <a:rPr lang="en-US" i="1" dirty="0"/>
               <a:t>the content of          </a:t>
             </a:r>
             <a:r>
-              <a:rPr lang="en-US" i="1" dirty="0" smtClean="0">
+              <a:rPr lang="en-US" i="1" dirty="0">
                 <a:solidFill>
                   <a:schemeClr val="bg1"/>
                 </a:solidFill>
@@ -3765,18 +3719,14 @@
               <a:t>.</a:t>
             </a:r>
             <a:r>
-              <a:rPr lang="en-US" i="1" dirty="0" smtClean="0"/>
+              <a:rPr lang="en-US" i="1" dirty="0"/>
               <a:t>    </a:t>
             </a:r>
-            <a:r>
-              <a:rPr lang="en-US" i="1" dirty="0" smtClean="0"/>
-              <a:t/>
-            </a:r>
             <a:br>
-              <a:rPr lang="en-US" i="1" dirty="0" smtClean="0"/>
+              <a:rPr lang="en-US" i="1" dirty="0"/>
             </a:br>
             <a:r>
-              <a:rPr lang="en-US" dirty="0" smtClean="0">
+              <a:rPr lang="en-US" dirty="0">
                 <a:solidFill>
                   <a:schemeClr val="bg1"/>
                 </a:solidFill>
@@ -3784,14 +3734,9 @@
               <a:t>.</a:t>
             </a:r>
             <a:r>
-              <a:rPr lang="en-US" dirty="0" smtClean="0"/>
-              <a:t>           </a:t>
-            </a:r>
-            <a:r>
-              <a:rPr lang="en-US" dirty="0" smtClean="0"/>
-              <a:t>a Review Analysis?</a:t>
-            </a:r>
-            <a:endParaRPr lang="en-US" dirty="0"/>
+              <a:rPr lang="en-US" dirty="0"/>
+              <a:t>           a Review Analysis?</a:t>
+            </a:r>
           </a:p>
         </p:txBody>
       </p:sp>
@@ -3818,92 +3763,91 @@
           <a:lstStyle/>
           <a:p>
             <a:r>
-              <a:rPr lang="en-US" dirty="0" smtClean="0"/>
+              <a:rPr lang="en-US" dirty="0"/>
               <a:t>Award or Decline Recommendation</a:t>
             </a:r>
           </a:p>
           <a:p>
             <a:r>
-              <a:rPr lang="en-US" dirty="0" smtClean="0"/>
+              <a:rPr lang="en-US" dirty="0"/>
               <a:t>Project</a:t>
             </a:r>
           </a:p>
           <a:p>
             <a:pPr lvl="1"/>
             <a:r>
-              <a:rPr lang="en-US" dirty="0" smtClean="0"/>
+              <a:rPr lang="en-US" dirty="0"/>
               <a:t>Solicitation, program</a:t>
             </a:r>
           </a:p>
           <a:p>
             <a:pPr lvl="1"/>
             <a:r>
-              <a:rPr lang="en-US" dirty="0" smtClean="0"/>
+              <a:rPr lang="en-US" dirty="0"/>
               <a:t>Leads/non-lead PIs, Institutions</a:t>
             </a:r>
           </a:p>
           <a:p>
             <a:pPr lvl="1"/>
             <a:r>
-              <a:rPr lang="en-US" dirty="0" smtClean="0"/>
+              <a:rPr lang="en-US" dirty="0"/>
               <a:t>Requested $, awarded $</a:t>
             </a:r>
-            <a:endParaRPr lang="en-US" dirty="0"/>
-          </a:p>
-          <a:p>
-            <a:r>
-              <a:rPr lang="en-US" dirty="0" smtClean="0"/>
+          </a:p>
+          <a:p>
+            <a:r>
+              <a:rPr lang="en-US" dirty="0"/>
               <a:t>Panel(s)</a:t>
             </a:r>
           </a:p>
           <a:p>
             <a:pPr lvl="1"/>
             <a:r>
-              <a:rPr lang="en-US" dirty="0" smtClean="0"/>
+              <a:rPr lang="en-US" dirty="0"/>
               <a:t>Name, date, # panelists</a:t>
             </a:r>
           </a:p>
           <a:p>
             <a:pPr lvl="1"/>
             <a:r>
-              <a:rPr lang="en-US" dirty="0" smtClean="0"/>
+              <a:rPr lang="en-US" dirty="0"/>
               <a:t>Recommendation, reviews</a:t>
             </a:r>
           </a:p>
           <a:p>
             <a:pPr lvl="1"/>
             <a:r>
-              <a:rPr lang="en-US" dirty="0" smtClean="0"/>
+              <a:rPr lang="en-US" dirty="0"/>
               <a:t>Summary of panel decisions</a:t>
             </a:r>
           </a:p>
           <a:p>
             <a:r>
-              <a:rPr lang="en-US" dirty="0" smtClean="0"/>
+              <a:rPr lang="en-US" dirty="0"/>
               <a:t>Ad hoc reviews</a:t>
             </a:r>
           </a:p>
           <a:p>
             <a:r>
-              <a:rPr lang="en-US" b="1" dirty="0" smtClean="0"/>
+              <a:rPr lang="en-US" b="1" dirty="0"/>
               <a:t>Narrative text</a:t>
             </a:r>
           </a:p>
           <a:p>
             <a:r>
-              <a:rPr lang="en-US" dirty="0" smtClean="0"/>
+              <a:rPr lang="en-US" dirty="0"/>
               <a:t>Signature block</a:t>
             </a:r>
           </a:p>
           <a:p>
             <a:r>
-              <a:rPr lang="en-US" dirty="0" smtClean="0"/>
+              <a:rPr lang="en-US" dirty="0"/>
               <a:t>Notes to DGA</a:t>
             </a:r>
           </a:p>
           <a:p>
             <a:r>
-              <a:rPr lang="en-US" dirty="0" smtClean="0"/>
+              <a:rPr lang="en-US" dirty="0"/>
               <a:t>Budget</a:t>
             </a:r>
           </a:p>
@@ -3948,13 +3892,6 @@
   <p:clrMapOvr>
     <a:masterClrMapping/>
   </p:clrMapOvr>
-  <p:timing>
-    <p:tnLst>
-      <p:par>
-        <p:cTn id="1" dur="indefinite" restart="never" nodeType="tmRoot"/>
-      </p:par>
-    </p:tnLst>
-  </p:timing>
 </p:sld>
 </file>
 
@@ -3994,30 +3931,26 @@
           <a:p>
             <a:pPr algn="ctr"/>
             <a:r>
-              <a:rPr lang="en-US" dirty="0" smtClean="0"/>
+              <a:rPr lang="en-US" dirty="0"/>
               <a:t>What is </a:t>
             </a:r>
             <a:r>
-              <a:rPr lang="en-US" i="1" dirty="0" smtClean="0"/>
+              <a:rPr lang="en-US" i="1" dirty="0"/>
               <a:t>required in            </a:t>
             </a:r>
             <a:r>
-              <a:rPr lang="en-US" i="1" dirty="0" smtClean="0">
+              <a:rPr lang="en-US" i="1" dirty="0">
                 <a:solidFill>
                   <a:schemeClr val="bg1"/>
                 </a:solidFill>
               </a:rPr>
               <a:t>    .</a:t>
             </a:r>
-            <a:r>
-              <a:rPr lang="en-US" dirty="0" smtClean="0"/>
-              <a:t/>
-            </a:r>
             <a:br>
-              <a:rPr lang="en-US" dirty="0" smtClean="0"/>
+              <a:rPr lang="en-US" dirty="0"/>
             </a:br>
             <a:r>
-              <a:rPr lang="en-US" dirty="0" smtClean="0">
+              <a:rPr lang="en-US" dirty="0">
                 <a:solidFill>
                   <a:schemeClr val="bg1"/>
                 </a:solidFill>
@@ -4025,14 +3958,9 @@
               <a:t>.</a:t>
             </a:r>
             <a:r>
-              <a:rPr lang="en-US" dirty="0" smtClean="0"/>
-              <a:t>           </a:t>
-            </a:r>
-            <a:r>
-              <a:rPr lang="en-US" dirty="0" smtClean="0"/>
-              <a:t>a Review Analysis?</a:t>
-            </a:r>
-            <a:endParaRPr lang="en-US" dirty="0"/>
+              <a:rPr lang="en-US" dirty="0"/>
+              <a:t>           a Review Analysis?</a:t>
+            </a:r>
           </a:p>
         </p:txBody>
       </p:sp>
@@ -4054,94 +3982,93 @@
           <a:lstStyle/>
           <a:p>
             <a:r>
-              <a:rPr lang="en-US" dirty="0" smtClean="0"/>
+              <a:rPr lang="en-US" dirty="0"/>
               <a:t>PAM says…</a:t>
             </a:r>
           </a:p>
           <a:p>
             <a:pPr lvl="1"/>
             <a:r>
-              <a:rPr lang="en-US" dirty="0" smtClean="0"/>
+              <a:rPr lang="en-US" dirty="0"/>
               <a:t>Summary of review findings</a:t>
             </a:r>
           </a:p>
           <a:p>
             <a:pPr lvl="1"/>
             <a:r>
-              <a:rPr lang="en-US" dirty="0" smtClean="0"/>
+              <a:rPr lang="en-US" dirty="0"/>
               <a:t>How project addresses IM &amp; BI</a:t>
             </a:r>
           </a:p>
           <a:p>
             <a:pPr lvl="1"/>
             <a:r>
-              <a:rPr lang="en-US" dirty="0" smtClean="0"/>
+              <a:rPr lang="en-US" dirty="0"/>
               <a:t>reviews </a:t>
             </a:r>
             <a:r>
-              <a:rPr lang="en-US" dirty="0" smtClean="0">
+              <a:rPr lang="en-US" dirty="0">
                 <a:sym typeface="Symbol" panose="05050102010706020507" pitchFamily="18" charset="2"/>
               </a:rPr>
               <a:t> </a:t>
             </a:r>
             <a:r>
-              <a:rPr lang="en-US" dirty="0" smtClean="0"/>
+              <a:rPr lang="en-US" dirty="0"/>
               <a:t>recommendation: </a:t>
             </a:r>
             <a:br>
-              <a:rPr lang="en-US" dirty="0" smtClean="0"/>
+              <a:rPr lang="en-US" dirty="0"/>
             </a:br>
             <a:r>
-              <a:rPr lang="en-US" dirty="0" smtClean="0"/>
+              <a:rPr lang="en-US" dirty="0"/>
               <a:t>F or P on award &amp; E on decline</a:t>
             </a:r>
           </a:p>
           <a:p>
             <a:pPr lvl="1"/>
             <a:r>
-              <a:rPr lang="en-US" dirty="0" smtClean="0"/>
+              <a:rPr lang="en-US" dirty="0"/>
               <a:t>PI response to criticisms</a:t>
             </a:r>
           </a:p>
           <a:p>
             <a:pPr lvl="1"/>
             <a:r>
-              <a:rPr lang="en-US" dirty="0" smtClean="0"/>
+              <a:rPr lang="en-US" dirty="0"/>
               <a:t>Budget considerations</a:t>
             </a:r>
           </a:p>
           <a:p>
             <a:pPr lvl="1"/>
             <a:r>
-              <a:rPr lang="en-US" dirty="0" smtClean="0"/>
+              <a:rPr lang="en-US" dirty="0"/>
               <a:t>Multiple ratings</a:t>
             </a:r>
           </a:p>
           <a:p>
             <a:pPr lvl="1"/>
             <a:r>
-              <a:rPr lang="en-US" dirty="0" smtClean="0"/>
+              <a:rPr lang="en-US" dirty="0"/>
               <a:t>Triage</a:t>
             </a:r>
           </a:p>
           <a:p>
             <a:pPr lvl="1"/>
             <a:r>
-              <a:rPr lang="en-US" dirty="0" smtClean="0"/>
+              <a:rPr lang="en-US" dirty="0"/>
               <a:t>Special instructions for DGA</a:t>
             </a:r>
-            <a:endParaRPr lang="en-US" dirty="0"/>
-          </a:p>
-          <a:p>
-            <a:r>
-              <a:rPr lang="en-US" dirty="0" smtClean="0"/>
+          </a:p>
+          <a:p>
+            <a:r>
+              <a:rPr lang="en-US" dirty="0"/>
               <a:t>Does not ask for </a:t>
             </a:r>
           </a:p>
           <a:p>
             <a:pPr lvl="1"/>
             <a:r>
-              <a:rPr lang="en-US" dirty="0" smtClean="0"/>
+              <a:rPr lang="en-US" dirty="0"/>
               <a:t>Duplication of context, project summary, conflicts, or other items in eJacket or in panel minutes.</a:t>
             </a:r>
           </a:p>
@@ -4186,13 +4113,6 @@
   <p:clrMapOvr>
     <a:masterClrMapping/>
   </p:clrMapOvr>
-  <p:timing>
-    <p:tnLst>
-      <p:par>
-        <p:cTn id="1" dur="indefinite" restart="never" nodeType="tmRoot"/>
-      </p:par>
-    </p:tnLst>
-  </p:timing>
 </p:sld>
 </file>
 
@@ -4234,86 +4154,84 @@
               <a:buNone/>
             </a:pPr>
             <a:r>
-              <a:rPr lang="en-US" dirty="0" smtClean="0"/>
+              <a:rPr lang="en-US" dirty="0"/>
               <a:t>For each proposal:</a:t>
             </a:r>
           </a:p>
           <a:p>
             <a:r>
-              <a:rPr lang="en-US" dirty="0" smtClean="0"/>
+              <a:rPr lang="en-US" dirty="0"/>
               <a:t>Find someone’s RA</a:t>
             </a:r>
           </a:p>
           <a:p>
             <a:r>
-              <a:rPr lang="en-US" dirty="0" smtClean="0"/>
+              <a:rPr lang="en-US" dirty="0"/>
               <a:t>Copy it</a:t>
             </a:r>
           </a:p>
           <a:p>
             <a:r>
-              <a:rPr lang="en-US" dirty="0" smtClean="0"/>
+              <a:rPr lang="en-US" dirty="0"/>
               <a:t>Replace all project-specific text</a:t>
             </a:r>
           </a:p>
           <a:p>
             <a:pPr lvl="1"/>
             <a:r>
-              <a:rPr lang="en-US" dirty="0" smtClean="0"/>
+              <a:rPr lang="en-US" dirty="0"/>
               <a:t>Visit Fastlane for panel &amp; review info</a:t>
             </a:r>
           </a:p>
           <a:p>
             <a:pPr lvl="1"/>
             <a:r>
-              <a:rPr lang="en-US" dirty="0" smtClean="0"/>
+              <a:rPr lang="en-US" dirty="0"/>
               <a:t>Visit eJacket for reviews and summary</a:t>
             </a:r>
           </a:p>
           <a:p>
             <a:pPr lvl="1"/>
             <a:r>
-              <a:rPr lang="en-US" dirty="0" smtClean="0"/>
+              <a:rPr lang="en-US" dirty="0"/>
               <a:t>Review your panel notes</a:t>
             </a:r>
           </a:p>
           <a:p>
             <a:r>
-              <a:rPr lang="en-US" dirty="0" smtClean="0"/>
+              <a:rPr lang="en-US" dirty="0"/>
               <a:t>Write narrative text</a:t>
             </a:r>
           </a:p>
           <a:p>
             <a:r>
-              <a:rPr lang="en-US" dirty="0" smtClean="0"/>
+              <a:rPr lang="en-US" dirty="0"/>
               <a:t>Paste or upload to eJacket</a:t>
             </a:r>
           </a:p>
           <a:p>
             <a:r>
-              <a:rPr lang="en-US" dirty="0" smtClean="0"/>
+              <a:rPr lang="en-US" dirty="0"/>
               <a:t>Hand it over to Admin Review</a:t>
             </a:r>
           </a:p>
           <a:p>
             <a:r>
-              <a:rPr lang="en-US" dirty="0" smtClean="0"/>
+              <a:rPr lang="en-US" dirty="0"/>
               <a:t>Recommend for DD concur</a:t>
             </a:r>
-            <a:endParaRPr lang="en-US" dirty="0" smtClean="0"/>
-          </a:p>
-          <a:p>
-            <a:endParaRPr lang="en-US" dirty="0" smtClean="0"/>
+          </a:p>
+          <a:p>
+            <a:endParaRPr lang="en-US" dirty="0"/>
           </a:p>
           <a:p>
             <a:pPr marL="0" indent="0">
               <a:buNone/>
             </a:pPr>
             <a:r>
-              <a:rPr lang="en-US" dirty="0" smtClean="0"/>
-              <a:t>Every have copy/paste errors?</a:t>
-            </a:r>
-            <a:endParaRPr lang="en-US" dirty="0"/>
+              <a:rPr lang="en-US" dirty="0"/>
+              <a:t>Ever have copy/paste errors?</a:t>
+            </a:r>
           </a:p>
         </p:txBody>
       </p:sp>
@@ -4376,30 +4294,26 @@
           <a:p>
             <a:pPr algn="ctr"/>
             <a:r>
-              <a:rPr lang="en-US" dirty="0" smtClean="0"/>
+              <a:rPr lang="en-US" dirty="0"/>
               <a:t>What is </a:t>
             </a:r>
             <a:r>
-              <a:rPr lang="en-US" i="1" dirty="0" smtClean="0"/>
+              <a:rPr lang="en-US" i="1" dirty="0"/>
               <a:t>the workflow for     </a:t>
             </a:r>
             <a:r>
-              <a:rPr lang="en-US" i="1" dirty="0" smtClean="0">
+              <a:rPr lang="en-US" i="1" dirty="0">
                 <a:solidFill>
                   <a:schemeClr val="bg1"/>
                 </a:solidFill>
               </a:rPr>
               <a:t>.</a:t>
             </a:r>
-            <a:r>
-              <a:rPr lang="en-US" dirty="0" smtClean="0"/>
-              <a:t/>
-            </a:r>
             <a:br>
-              <a:rPr lang="en-US" dirty="0" smtClean="0"/>
+              <a:rPr lang="en-US" dirty="0"/>
             </a:br>
             <a:r>
-              <a:rPr lang="en-US" dirty="0" smtClean="0">
+              <a:rPr lang="en-US" dirty="0">
                 <a:solidFill>
                   <a:schemeClr val="bg1"/>
                 </a:solidFill>
@@ -4407,10 +4321,9 @@
               <a:t>.</a:t>
             </a:r>
             <a:r>
-              <a:rPr lang="en-US" dirty="0" smtClean="0"/>
+              <a:rPr lang="en-US" dirty="0"/>
               <a:t>           a Review Analysis?</a:t>
             </a:r>
-            <a:endParaRPr lang="en-US" dirty="0"/>
           </a:p>
         </p:txBody>
       </p:sp>
@@ -5079,34 +4992,26 @@
           <a:p>
             <a:pPr algn="ctr"/>
             <a:r>
-              <a:rPr lang="en-US" dirty="0" smtClean="0"/>
-              <a:t>What </a:t>
-            </a:r>
-            <a:r>
-              <a:rPr lang="en-US" dirty="0" smtClean="0"/>
-              <a:t>is </a:t>
-            </a:r>
-            <a:r>
-              <a:rPr lang="en-US" i="1" dirty="0" smtClean="0"/>
+              <a:rPr lang="en-US" dirty="0"/>
+              <a:t>What is </a:t>
+            </a:r>
+            <a:r>
+              <a:rPr lang="en-US" i="1" dirty="0"/>
               <a:t>the easy way to do</a:t>
             </a:r>
             <a:r>
-              <a:rPr lang="en-US" i="1" dirty="0" smtClean="0">
+              <a:rPr lang="en-US" i="1" dirty="0">
                 <a:solidFill>
                   <a:schemeClr val="bg1"/>
                 </a:solidFill>
               </a:rPr>
               <a:t> ..</a:t>
             </a:r>
-            <a:r>
-              <a:rPr lang="en-US" dirty="0" smtClean="0"/>
-              <a:t/>
-            </a:r>
             <a:br>
-              <a:rPr lang="en-US" dirty="0" smtClean="0"/>
+              <a:rPr lang="en-US" dirty="0"/>
             </a:br>
             <a:r>
-              <a:rPr lang="en-US" dirty="0" smtClean="0">
+              <a:rPr lang="en-US" dirty="0">
                 <a:solidFill>
                   <a:schemeClr val="bg1"/>
                 </a:solidFill>
@@ -5114,26 +5019,9 @@
               <a:t>.</a:t>
             </a:r>
             <a:r>
-              <a:rPr lang="en-US" dirty="0" smtClean="0"/>
-              <a:t>    </a:t>
-            </a:r>
-            <a:r>
-              <a:rPr lang="en-US" dirty="0" smtClean="0"/>
-              <a:t>many </a:t>
-            </a:r>
-            <a:r>
-              <a:rPr lang="en-US" dirty="0" smtClean="0"/>
-              <a:t>Review </a:t>
-            </a:r>
-            <a:r>
-              <a:rPr lang="en-US" dirty="0" smtClean="0"/>
-              <a:t>Analyses</a:t>
-            </a:r>
-            <a:r>
-              <a:rPr lang="en-US" dirty="0" smtClean="0"/>
-              <a:t>?</a:t>
-            </a:r>
-            <a:endParaRPr lang="en-US" dirty="0"/>
+              <a:rPr lang="en-US" dirty="0"/>
+              <a:t>    many Review Analyses?</a:t>
+            </a:r>
           </a:p>
         </p:txBody>
       </p:sp>
@@ -5160,78 +5048,73 @@
           <a:lstStyle/>
           <a:p>
             <a:pPr marL="0" indent="0">
+              <a:lnSpc>
+                <a:spcPct val="110000"/>
+              </a:lnSpc>
               <a:buNone/>
             </a:pPr>
             <a:r>
-              <a:rPr lang="en-US" b="1" dirty="0" err="1" smtClean="0"/>
+              <a:rPr lang="en-US" b="1" dirty="0" err="1"/>
               <a:t>RoboRA</a:t>
             </a:r>
             <a:r>
-              <a:rPr lang="en-US" b="1" dirty="0" smtClean="0"/>
+              <a:rPr lang="en-US" b="1" dirty="0"/>
               <a:t>,</a:t>
             </a:r>
             <a:r>
-              <a:rPr lang="en-US" dirty="0" smtClean="0"/>
-              <a:t> an Excel tool, f</a:t>
-            </a:r>
-            <a:r>
-              <a:rPr lang="en-US" dirty="0" smtClean="0"/>
-              <a:t>ills </a:t>
+              <a:rPr lang="en-US" dirty="0"/>
+              <a:t> an Excel tool, fills </a:t>
             </a:r>
             <a:br>
-              <a:rPr lang="en-US" dirty="0" smtClean="0"/>
+              <a:rPr lang="en-US" dirty="0"/>
             </a:br>
             <a:r>
-              <a:rPr lang="en-US" b="1" dirty="0" smtClean="0"/>
+              <a:rPr lang="en-US" b="1" dirty="0"/>
               <a:t>RA templates </a:t>
             </a:r>
             <a:r>
-              <a:rPr lang="en-US" dirty="0" smtClean="0"/>
+              <a:rPr lang="en-US" dirty="0"/>
               <a:t>with </a:t>
             </a:r>
             <a:r>
-              <a:rPr lang="en-US" dirty="0" err="1" smtClean="0"/>
+              <a:rPr lang="en-US" dirty="0" err="1"/>
               <a:t>reportserver</a:t>
             </a:r>
             <a:r>
-              <a:rPr lang="en-US" dirty="0" smtClean="0"/>
-              <a:t> </a:t>
-            </a:r>
-            <a:r>
-              <a:rPr lang="en-US" dirty="0" smtClean="0"/>
-              <a:t>data to make </a:t>
-            </a:r>
-            <a:r>
-              <a:rPr lang="en-US" b="1" dirty="0" smtClean="0"/>
+              <a:rPr lang="en-US" dirty="0"/>
+              <a:t> data to make </a:t>
+            </a:r>
+            <a:r>
+              <a:rPr lang="en-US" b="1" dirty="0"/>
               <a:t>RA drafts</a:t>
             </a:r>
             <a:r>
-              <a:rPr lang="en-US" dirty="0" smtClean="0"/>
+              <a:rPr lang="en-US" dirty="0"/>
               <a:t> in Word or eJacket</a:t>
             </a:r>
-            <a:endParaRPr lang="en-US" b="1" dirty="0" smtClean="0"/>
-          </a:p>
-          <a:p>
-            <a:r>
-              <a:rPr lang="en-US" sz="2400" dirty="0" smtClean="0"/>
+            <a:endParaRPr lang="en-US" b="1" dirty="0"/>
+          </a:p>
+          <a:p>
+            <a:r>
+              <a:rPr lang="en-US" sz="2400" dirty="0"/>
               <a:t>You write the narrative </a:t>
             </a:r>
           </a:p>
           <a:p>
             <a:r>
-              <a:rPr lang="en-US" sz="2400" dirty="0" smtClean="0"/>
+              <a:rPr lang="en-US" sz="2400" dirty="0"/>
               <a:t>If co-fund/continuing, edit budget</a:t>
             </a:r>
           </a:p>
           <a:p>
             <a:r>
-              <a:rPr lang="en-US" sz="2400" dirty="0" smtClean="0"/>
+              <a:rPr lang="en-US" sz="2400" dirty="0"/>
               <a:t>One click to eJacket &amp; paste</a:t>
             </a:r>
             <a:br>
-              <a:rPr lang="en-US" sz="2400" dirty="0" smtClean="0"/>
+              <a:rPr lang="en-US" sz="2400" dirty="0"/>
             </a:br>
-            <a:endParaRPr lang="en-US" sz="1000" dirty="0" smtClean="0"/>
+            <a:endParaRPr lang="en-US" sz="1000" dirty="0"/>
           </a:p>
           <a:p>
             <a:pPr>
@@ -5239,7 +5122,7 @@
               <a:buChar char="ü"/>
             </a:pPr>
             <a:r>
-              <a:rPr lang="en-US" sz="2400" dirty="0" smtClean="0"/>
+              <a:rPr lang="en-US" sz="2400" dirty="0"/>
               <a:t>Fixes special chars/strips comments</a:t>
             </a:r>
           </a:p>
@@ -5249,7 +5132,7 @@
               <a:buChar char="ü"/>
             </a:pPr>
             <a:r>
-              <a:rPr lang="en-US" sz="2400" dirty="0" smtClean="0"/>
+              <a:rPr lang="en-US" sz="2400" dirty="0"/>
               <a:t>Auto-upload standard declines</a:t>
             </a:r>
           </a:p>
@@ -5259,7 +5142,7 @@
               <a:buChar char="ü"/>
             </a:pPr>
             <a:r>
-              <a:rPr lang="en-US" sz="2400" dirty="0" smtClean="0"/>
+              <a:rPr lang="en-US" sz="2400" dirty="0"/>
               <a:t>Retrieves text documents to pdf</a:t>
             </a:r>
           </a:p>
@@ -5269,7 +5152,7 @@
               <a:buChar char="ü"/>
             </a:pPr>
             <a:r>
-              <a:rPr lang="en-US" sz="2400" dirty="0" smtClean="0"/>
+              <a:rPr lang="en-US" sz="2400" dirty="0"/>
               <a:t>Last revised budget $ in spreadsheet</a:t>
             </a:r>
           </a:p>
@@ -5279,7 +5162,7 @@
               <a:buChar char="ü"/>
             </a:pPr>
             <a:r>
-              <a:rPr lang="en-US" sz="2400" dirty="0" smtClean="0"/>
+              <a:rPr lang="en-US" sz="2400" dirty="0"/>
               <a:t>Check coding worksheets</a:t>
             </a:r>
           </a:p>
@@ -5289,7 +5172,7 @@
               <a:buChar char="ü"/>
             </a:pPr>
             <a:r>
-              <a:rPr lang="en-US" sz="2400" dirty="0" smtClean="0"/>
+              <a:rPr lang="en-US" sz="2400" dirty="0"/>
               <a:t>Supports many working styles</a:t>
             </a:r>
           </a:p>
@@ -5367,7 +5250,7 @@
           <a:lstStyle/>
           <a:p>
             <a:r>
-              <a:rPr lang="en-US" dirty="0" smtClean="0"/>
+              <a:rPr lang="en-US" dirty="0"/>
               <a:t>PC or Citrix</a:t>
             </a:r>
           </a:p>
@@ -5413,7 +5296,7 @@
           <a:lstStyle/>
           <a:p>
             <a:r>
-              <a:rPr lang="en-US" dirty="0" smtClean="0"/>
+              <a:rPr lang="en-US" dirty="0"/>
               <a:t>Mac or PC</a:t>
             </a:r>
           </a:p>
@@ -5631,37 +5514,32 @@
           <a:p>
             <a:pPr algn="ctr"/>
             <a:r>
-              <a:rPr lang="en-US" dirty="0" smtClean="0"/>
+              <a:rPr lang="en-US" dirty="0"/>
               <a:t>What </a:t>
             </a:r>
             <a:r>
-              <a:rPr lang="en-US" i="1" dirty="0" smtClean="0"/>
+              <a:rPr lang="en-US" i="1" dirty="0"/>
               <a:t>do I need to try           </a:t>
             </a:r>
             <a:r>
-              <a:rPr lang="en-US" i="1" dirty="0" smtClean="0">
+              <a:rPr lang="en-US" i="1" dirty="0">
                 <a:solidFill>
                   <a:schemeClr val="bg1"/>
                 </a:solidFill>
               </a:rPr>
               <a:t>.</a:t>
             </a:r>
-            <a:r>
-              <a:rPr lang="en-US" i="1" dirty="0" smtClean="0"/>
-              <a:t/>
-            </a:r>
             <a:br>
-              <a:rPr lang="en-US" i="1" dirty="0" smtClean="0"/>
+              <a:rPr lang="en-US" i="1" dirty="0"/>
             </a:br>
             <a:r>
-              <a:rPr lang="en-US" dirty="0" err="1" smtClean="0"/>
+              <a:rPr lang="en-US" dirty="0" err="1"/>
               <a:t>RoboRA</a:t>
             </a:r>
             <a:r>
-              <a:rPr lang="en-US" dirty="0" smtClean="0"/>
+              <a:rPr lang="en-US" dirty="0"/>
               <a:t>?</a:t>
             </a:r>
-            <a:endParaRPr lang="en-US" dirty="0"/>
           </a:p>
         </p:txBody>
       </p:sp>
@@ -5691,107 +5569,95 @@
               <a:buNone/>
             </a:pPr>
             <a:r>
-              <a:rPr lang="en-US" b="1" dirty="0" smtClean="0"/>
+              <a:rPr lang="en-US" b="1" dirty="0"/>
               <a:t>To create RA drafts:</a:t>
             </a:r>
           </a:p>
           <a:p>
             <a:r>
-              <a:rPr lang="en-US" dirty="0" err="1" smtClean="0"/>
+              <a:rPr lang="en-US" dirty="0" err="1"/>
               <a:t>Reportserver</a:t>
             </a:r>
             <a:r>
-              <a:rPr lang="en-US" dirty="0" smtClean="0"/>
+              <a:rPr lang="en-US" dirty="0"/>
               <a:t> access</a:t>
             </a:r>
           </a:p>
           <a:p>
             <a:pPr lvl="1"/>
             <a:r>
-              <a:rPr lang="en-US" dirty="0" smtClean="0"/>
-              <a:t>Division username</a:t>
-            </a:r>
-            <a:r>
-              <a:rPr lang="en-US" dirty="0"/>
-              <a:t>,</a:t>
-            </a:r>
-            <a:r>
-              <a:rPr lang="en-US" dirty="0" smtClean="0"/>
-              <a:t> password; ca</a:t>
-            </a:r>
-            <a:r>
-              <a:rPr lang="en-US" dirty="0" smtClean="0"/>
-              <a:t>n be saved in </a:t>
-            </a:r>
-            <a:r>
-              <a:rPr lang="en-US" dirty="0" err="1" smtClean="0"/>
+              <a:rPr lang="en-US" dirty="0"/>
+              <a:t>Division username, password; can be saved in </a:t>
+            </a:r>
+            <a:r>
+              <a:rPr lang="en-US" dirty="0" err="1"/>
               <a:t>RoboRA</a:t>
             </a:r>
-            <a:endParaRPr lang="en-US" dirty="0" smtClean="0"/>
+            <a:endParaRPr lang="en-US" dirty="0"/>
           </a:p>
           <a:p>
             <a:pPr lvl="1"/>
             <a:r>
-              <a:rPr lang="en-US" dirty="0" smtClean="0"/>
+              <a:rPr lang="en-US" dirty="0"/>
               <a:t>PC on NSF network, Citrix Desktop 7, or Mac with </a:t>
             </a:r>
             <a:r>
-              <a:rPr lang="en-US" dirty="0" err="1" smtClean="0"/>
+              <a:rPr lang="en-US" dirty="0" err="1"/>
               <a:t>Openlink</a:t>
             </a:r>
-            <a:endParaRPr lang="en-US" dirty="0" smtClean="0"/>
-          </a:p>
-          <a:p>
-            <a:r>
-              <a:rPr lang="en-US" dirty="0" smtClean="0"/>
+            <a:endParaRPr lang="en-US" dirty="0"/>
+          </a:p>
+          <a:p>
+            <a:r>
+              <a:rPr lang="en-US" dirty="0"/>
               <a:t>RA templates (on </a:t>
             </a:r>
             <a:r>
-              <a:rPr lang="en-US" dirty="0" err="1" smtClean="0"/>
+              <a:rPr lang="en-US" dirty="0" err="1"/>
               <a:t>sharepoint</a:t>
             </a:r>
             <a:r>
-              <a:rPr lang="en-US" dirty="0" smtClean="0"/>
+              <a:rPr lang="en-US" dirty="0"/>
               <a:t> or locally)</a:t>
             </a:r>
           </a:p>
           <a:p>
             <a:r>
-              <a:rPr lang="en-US" dirty="0" smtClean="0"/>
+              <a:rPr lang="en-US" dirty="0"/>
               <a:t>Simple: proposal ids for award, decline, and/or </a:t>
             </a:r>
             <a:r>
-              <a:rPr lang="en-US" dirty="0" err="1" smtClean="0"/>
+              <a:rPr lang="en-US" dirty="0" err="1"/>
               <a:t>std</a:t>
             </a:r>
             <a:r>
-              <a:rPr lang="en-US" dirty="0" smtClean="0"/>
+              <a:rPr lang="en-US" dirty="0"/>
               <a:t> decline</a:t>
             </a:r>
           </a:p>
           <a:p>
             <a:r>
-              <a:rPr lang="en-US" dirty="0" smtClean="0"/>
+              <a:rPr lang="en-US" dirty="0"/>
               <a:t>Advanced: panel, program, solicitation, or PD ids. </a:t>
             </a:r>
-            <a:endParaRPr lang="en-US" sz="1500" dirty="0" smtClean="0"/>
+            <a:endParaRPr lang="en-US" sz="1500" dirty="0"/>
           </a:p>
           <a:p>
             <a:pPr marL="0" indent="0">
               <a:buNone/>
             </a:pPr>
             <a:r>
-              <a:rPr lang="en-US" sz="1500" b="1" dirty="0" smtClean="0"/>
+              <a:rPr lang="en-US" sz="1500" b="1" dirty="0"/>
               <a:t> </a:t>
             </a:r>
             <a:r>
-              <a:rPr lang="en-US" b="1" dirty="0" smtClean="0"/>
+              <a:rPr lang="en-US" b="1" dirty="0"/>
               <a:t>To fill in RA drafts: </a:t>
             </a:r>
           </a:p>
           <a:p>
             <a:r>
-              <a:rPr lang="en-US" dirty="0" smtClean="0"/>
+              <a:rPr lang="en-US" dirty="0"/>
               <a:t>Your favorite editor</a:t>
             </a:r>
           </a:p>
@@ -5800,30 +5666,29 @@
               <a:buNone/>
             </a:pPr>
             <a:r>
-              <a:rPr lang="en-US" b="1" dirty="0" smtClean="0"/>
+              <a:rPr lang="en-US" b="1" dirty="0"/>
               <a:t>To put completed drafts in eJacket</a:t>
             </a:r>
           </a:p>
           <a:p>
             <a:r>
-              <a:rPr lang="en-US" dirty="0" smtClean="0"/>
-              <a:t>Word macros (in </a:t>
-            </a:r>
-            <a:r>
-              <a:rPr lang="en-US" dirty="0" err="1" smtClean="0"/>
+              <a:rPr lang="en-US" dirty="0"/>
+              <a:t>Word macros (copied from </a:t>
+            </a:r>
+            <a:r>
+              <a:rPr lang="en-US" dirty="0" err="1"/>
               <a:t>sharepoint</a:t>
             </a:r>
             <a:r>
-              <a:rPr lang="en-US" dirty="0" smtClean="0"/>
-              <a:t> or locally)</a:t>
-            </a:r>
-          </a:p>
-          <a:p>
-            <a:r>
-              <a:rPr lang="en-US" dirty="0" smtClean="0"/>
+              <a:rPr lang="en-US" dirty="0"/>
+              <a:t>)</a:t>
+            </a:r>
+          </a:p>
+          <a:p>
+            <a:r>
+              <a:rPr lang="en-US" dirty="0"/>
               <a:t>Web access to eJacket</a:t>
             </a:r>
-            <a:endParaRPr lang="en-US" dirty="0" smtClean="0"/>
           </a:p>
         </p:txBody>
       </p:sp>
@@ -5837,14 +5702,6 @@
   <p:clrMapOvr>
     <a:masterClrMapping/>
   </p:clrMapOvr>
-  <mc:AlternateContent xmlns:mc="http://schemas.openxmlformats.org/markup-compatibility/2006">
-    <mc:Choice xmlns:p14="http://schemas.microsoft.com/office/powerpoint/2010/main" Requires="p14">
-      <p:transition spd="slow" p14:dur="2000"/>
-    </mc:Choice>
-    <mc:Fallback>
-      <p:transition spd="slow"/>
-    </mc:Fallback>
-  </mc:AlternateContent>
   <p:timing>
     <p:tnLst>
       <p:par>
@@ -6538,57 +6395,49 @@
           <a:p>
             <a:pPr algn="ctr"/>
             <a:r>
-              <a:rPr lang="en-US" dirty="0" smtClean="0"/>
+              <a:rPr lang="en-US" dirty="0"/>
               <a:t>What is                                    </a:t>
             </a:r>
             <a:r>
-              <a:rPr lang="en-US" dirty="0" smtClean="0">
+              <a:rPr lang="en-US" dirty="0">
                 <a:solidFill>
                   <a:schemeClr val="bg1"/>
                 </a:solidFill>
               </a:rPr>
               <a:t>.</a:t>
             </a:r>
-            <a:r>
-              <a:rPr lang="en-US" dirty="0" smtClean="0"/>
-              <a:t/>
-            </a:r>
             <a:br>
-              <a:rPr lang="en-US" dirty="0" smtClean="0"/>
+              <a:rPr lang="en-US" dirty="0"/>
             </a:br>
             <a:r>
-              <a:rPr lang="en-US" dirty="0" smtClean="0"/>
+              <a:rPr lang="en-US" dirty="0"/>
               <a:t>What is </a:t>
             </a:r>
             <a:r>
-              <a:rPr lang="en-US" i="1" dirty="0" smtClean="0"/>
+              <a:rPr lang="en-US" i="1" dirty="0"/>
               <a:t>the audience for      </a:t>
             </a:r>
             <a:r>
-              <a:rPr lang="en-US" i="1" dirty="0" smtClean="0">
+              <a:rPr lang="en-US" i="1" dirty="0">
                 <a:solidFill>
                   <a:schemeClr val="bg1"/>
                 </a:solidFill>
               </a:rPr>
               <a:t>.</a:t>
             </a:r>
-            <a:r>
-              <a:rPr lang="en-US" i="1" dirty="0" smtClean="0"/>
-              <a:t/>
-            </a:r>
             <a:br>
-              <a:rPr lang="en-US" i="1" dirty="0" smtClean="0"/>
+              <a:rPr lang="en-US" i="1" dirty="0"/>
             </a:br>
             <a:r>
-              <a:rPr lang="en-US" dirty="0" smtClean="0"/>
+              <a:rPr lang="en-US" dirty="0"/>
               <a:t>What is </a:t>
             </a:r>
             <a:r>
-              <a:rPr lang="en-US" i="1" dirty="0" smtClean="0"/>
+              <a:rPr lang="en-US" i="1" dirty="0"/>
               <a:t>the content of          </a:t>
             </a:r>
             <a:r>
-              <a:rPr lang="en-US" i="1" dirty="0" smtClean="0">
+              <a:rPr lang="en-US" i="1" dirty="0">
                 <a:solidFill>
                   <a:schemeClr val="bg1"/>
                 </a:solidFill>
@@ -6596,76 +6445,71 @@
               <a:t>.</a:t>
             </a:r>
             <a:r>
-              <a:rPr lang="en-US" i="1" dirty="0" smtClean="0"/>
+              <a:rPr lang="en-US" i="1" dirty="0"/>
               <a:t>    </a:t>
             </a:r>
             <a:br>
-              <a:rPr lang="en-US" i="1" dirty="0" smtClean="0"/>
+              <a:rPr lang="en-US" i="1" dirty="0"/>
             </a:br>
             <a:r>
-              <a:rPr lang="en-US" dirty="0" smtClean="0"/>
+              <a:rPr lang="en-US" dirty="0"/>
               <a:t>What is </a:t>
             </a:r>
             <a:r>
-              <a:rPr lang="en-US" i="1" dirty="0" smtClean="0"/>
+              <a:rPr lang="en-US" i="1" dirty="0"/>
               <a:t>the way to make   </a:t>
             </a:r>
             <a:r>
-              <a:rPr lang="en-US" i="1" dirty="0" smtClean="0">
+              <a:rPr lang="en-US" i="1" dirty="0">
                 <a:solidFill>
                   <a:schemeClr val="bg1"/>
                 </a:solidFill>
               </a:rPr>
-              <a:t>  </a:t>
-            </a:r>
-            <a:r>
-              <a:rPr lang="en-US" i="1" dirty="0" smtClean="0">
+              <a:t>  .</a:t>
+            </a:r>
+            <a:br>
+              <a:rPr lang="en-US" dirty="0"/>
+            </a:br>
+            <a:r>
+              <a:rPr lang="en-US" dirty="0"/>
+              <a:t>What is </a:t>
+            </a:r>
+            <a:r>
+              <a:rPr lang="en-US" i="1" dirty="0"/>
+              <a:t>the file type of        </a:t>
+            </a:r>
+            <a:r>
+              <a:rPr lang="en-US" i="1" dirty="0">
+                <a:solidFill>
+                  <a:schemeClr val="bg1"/>
+                </a:solidFill>
+              </a:rPr>
+              <a:t> .</a:t>
+            </a:r>
+            <a:br>
+              <a:rPr lang="en-US" dirty="0"/>
+            </a:br>
+            <a:r>
+              <a:rPr lang="en-US" dirty="0"/>
+              <a:t>What is </a:t>
+            </a:r>
+            <a:r>
+              <a:rPr lang="en-US" i="1" dirty="0"/>
+              <a:t>the workflow for     </a:t>
+            </a:r>
+            <a:r>
+              <a:rPr lang="en-US" i="1" dirty="0">
                 <a:solidFill>
                   <a:schemeClr val="bg1"/>
                 </a:solidFill>
               </a:rPr>
               <a:t>.</a:t>
             </a:r>
-            <a:r>
-              <a:rPr lang="en-US" dirty="0" smtClean="0"/>
-              <a:t/>
-            </a:r>
             <a:br>
-              <a:rPr lang="en-US" dirty="0" smtClean="0"/>
+              <a:rPr lang="en-US" dirty="0"/>
             </a:br>
             <a:r>
-              <a:rPr lang="en-US" dirty="0" smtClean="0"/>
-              <a:t>What is </a:t>
-            </a:r>
-            <a:r>
-              <a:rPr lang="en-US" i="1" dirty="0" smtClean="0"/>
-              <a:t>the file type of        </a:t>
-            </a:r>
-            <a:r>
-              <a:rPr lang="en-US" i="1" dirty="0" smtClean="0">
-                <a:solidFill>
-                  <a:schemeClr val="bg1"/>
-                </a:solidFill>
-              </a:rPr>
-              <a:t> .</a:t>
-            </a:r>
-            <a:r>
-              <a:rPr lang="en-US" dirty="0" smtClean="0"/>
-              <a:t/>
-            </a:r>
-            <a:br>
-              <a:rPr lang="en-US" dirty="0" smtClean="0"/>
-            </a:br>
-            <a:r>
-              <a:rPr lang="en-US" dirty="0" smtClean="0"/>
-              <a:t>What is </a:t>
-            </a:r>
-            <a:r>
-              <a:rPr lang="en-US" i="1" dirty="0" smtClean="0"/>
-              <a:t>the workflow for     </a:t>
-            </a:r>
-            <a:r>
-              <a:rPr lang="en-US" i="1" dirty="0" smtClean="0">
+              <a:rPr lang="en-US" dirty="0">
                 <a:solidFill>
                   <a:schemeClr val="bg1"/>
                 </a:solidFill>
@@ -6673,25 +6517,9 @@
               <a:t>.</a:t>
             </a:r>
             <a:r>
-              <a:rPr lang="en-US" dirty="0" smtClean="0"/>
-              <a:t/>
-            </a:r>
-            <a:br>
-              <a:rPr lang="en-US" dirty="0" smtClean="0"/>
-            </a:br>
-            <a:r>
-              <a:rPr lang="en-US" dirty="0" smtClean="0">
-                <a:solidFill>
-                  <a:schemeClr val="bg1"/>
-                </a:solidFill>
-              </a:rPr>
-              <a:t>.</a:t>
-            </a:r>
-            <a:r>
-              <a:rPr lang="en-US" dirty="0" smtClean="0"/>
+              <a:rPr lang="en-US" dirty="0"/>
               <a:t>           a Review Analysis?</a:t>
             </a:r>
-            <a:endParaRPr lang="en-US" dirty="0"/>
           </a:p>
         </p:txBody>
       </p:sp>
@@ -6711,33 +6539,33 @@
           <a:lstStyle/>
           <a:p>
             <a:r>
-              <a:rPr lang="en-US" dirty="0" smtClean="0"/>
+              <a:rPr lang="en-US" dirty="0"/>
               <a:t>Who is it for?</a:t>
             </a:r>
           </a:p>
           <a:p>
             <a:r>
-              <a:rPr lang="en-US" dirty="0" smtClean="0"/>
+              <a:rPr lang="en-US" dirty="0"/>
               <a:t>What goes into it?</a:t>
             </a:r>
           </a:p>
           <a:p>
             <a:r>
-              <a:rPr lang="en-US" dirty="0" smtClean="0"/>
+              <a:rPr lang="en-US" dirty="0"/>
               <a:t>How do I create it?</a:t>
             </a:r>
           </a:p>
           <a:p>
             <a:r>
-              <a:rPr lang="en-US" dirty="0" smtClean="0"/>
+              <a:rPr lang="en-US" dirty="0"/>
               <a:t>Why so much tedious, error-prone </a:t>
             </a:r>
             <a:r>
-              <a:rPr lang="en-US" dirty="0" err="1" smtClean="0"/>
+              <a:rPr lang="en-US" dirty="0" err="1"/>
               <a:t>copy&amp;paste</a:t>
             </a:r>
             <a:r>
-              <a:rPr lang="en-US" dirty="0" smtClean="0"/>
+              <a:rPr lang="en-US" dirty="0"/>
               <a:t> to make one?</a:t>
             </a:r>
           </a:p>
@@ -6782,14 +6610,6 @@
   <p:clrMapOvr>
     <a:masterClrMapping/>
   </p:clrMapOvr>
-  <mc:AlternateContent xmlns:mc="http://schemas.openxmlformats.org/markup-compatibility/2006">
-    <mc:Choice xmlns:p14="http://schemas.microsoft.com/office/powerpoint/2010/main" Requires="p14">
-      <p:transition spd="slow" p14:dur="2000"/>
-    </mc:Choice>
-    <mc:Fallback>
-      <p:transition spd="slow"/>
-    </mc:Fallback>
-  </mc:AlternateContent>
   <p:timing>
     <p:tnLst>
       <p:par>

</xml_diff>